<commit_message>
Update presentation templates - Typo
</commit_message>
<xml_diff>
--- a/assets/documents/End of the Day Slides.pptx
+++ b/assets/documents/End of the Day Slides.pptx
@@ -281,7 +281,7 @@
           <a:p>
             <a:fld id="{C3E812A2-BA0E-4022-8B99-492E73CBDA70}" type="datetimeFigureOut">
               <a:rPr lang="en-US" smtClean="0"/>
-              <a:t>7/22/2025</a:t>
+              <a:t>7/24/2025</a:t>
             </a:fld>
             <a:endParaRPr lang="en-US" dirty="0"/>
           </a:p>
@@ -709,7 +709,7 @@
           <a:p>
             <a:fld id="{0C6C1A25-4366-4F4A-8222-0600C7D6B40D}" type="datetimeFigureOut">
               <a:rPr lang="en-US" smtClean="0"/>
-              <a:t>7/22/2025</a:t>
+              <a:t>7/24/2025</a:t>
             </a:fld>
             <a:endParaRPr lang="en-US" dirty="0"/>
           </a:p>
@@ -1054,7 +1054,7 @@
           <a:p>
             <a:fld id="{0C6C1A25-4366-4F4A-8222-0600C7D6B40D}" type="datetimeFigureOut">
               <a:rPr lang="en-US" smtClean="0"/>
-              <a:t>7/22/2025</a:t>
+              <a:t>7/24/2025</a:t>
             </a:fld>
             <a:endParaRPr lang="en-US" dirty="0"/>
           </a:p>
@@ -1511,7 +1511,7 @@
           <a:p>
             <a:fld id="{0C6C1A25-4366-4F4A-8222-0600C7D6B40D}" type="datetimeFigureOut">
               <a:rPr lang="en-US" smtClean="0"/>
-              <a:t>7/22/2025</a:t>
+              <a:t>7/24/2025</a:t>
             </a:fld>
             <a:endParaRPr lang="en-US" dirty="0"/>
           </a:p>
@@ -1749,7 +1749,7 @@
           <a:p>
             <a:fld id="{0C6C1A25-4366-4F4A-8222-0600C7D6B40D}" type="datetimeFigureOut">
               <a:rPr lang="en-US" smtClean="0"/>
-              <a:t>7/22/2025</a:t>
+              <a:t>7/24/2025</a:t>
             </a:fld>
             <a:endParaRPr lang="en-US" dirty="0"/>
           </a:p>
@@ -1987,7 +1987,7 @@
           <a:p>
             <a:fld id="{0C6C1A25-4366-4F4A-8222-0600C7D6B40D}" type="datetimeFigureOut">
               <a:rPr lang="en-US" smtClean="0"/>
-              <a:t>7/22/2025</a:t>
+              <a:t>7/24/2025</a:t>
             </a:fld>
             <a:endParaRPr lang="en-US" dirty="0"/>
           </a:p>
@@ -2433,7 +2433,7 @@
           <a:p>
             <a:fld id="{0C6C1A25-4366-4F4A-8222-0600C7D6B40D}" type="datetimeFigureOut">
               <a:rPr lang="en-US" smtClean="0"/>
-              <a:t>7/22/2025</a:t>
+              <a:t>7/24/2025</a:t>
             </a:fld>
             <a:endParaRPr lang="en-US" dirty="0"/>
           </a:p>
@@ -3675,7 +3675,7 @@
           <a:p>
             <a:fld id="{0C6C1A25-4366-4F4A-8222-0600C7D6B40D}" type="datetimeFigureOut">
               <a:rPr lang="en-US" smtClean="0"/>
-              <a:t>7/22/2025</a:t>
+              <a:t>7/24/2025</a:t>
             </a:fld>
             <a:endParaRPr lang="en-US" dirty="0"/>
           </a:p>
@@ -3848,7 +3848,7 @@
           <a:p>
             <a:fld id="{0C6C1A25-4366-4F4A-8222-0600C7D6B40D}" type="datetimeFigureOut">
               <a:rPr lang="en-US" smtClean="0"/>
-              <a:t>7/22/2025</a:t>
+              <a:t>7/24/2025</a:t>
             </a:fld>
             <a:endParaRPr lang="en-US" dirty="0"/>
           </a:p>
@@ -4878,11 +4878,11 @@
   <p:clrMapOvr>
     <a:masterClrMapping/>
   </p:clrMapOvr>
-  <mc:AlternateContent xmlns:mc="http://schemas.openxmlformats.org/markup-compatibility/2006">
-    <mc:Choice xmlns:p14="http://schemas.microsoft.com/office/powerpoint/2010/main" Requires="p14">
+  <mc:AlternateContent xmlns:mc="http://schemas.openxmlformats.org/markup-compatibility/2006" xmlns:p14="http://schemas.microsoft.com/office/powerpoint/2010/main">
+    <mc:Choice Requires="p14">
       <p:transition spd="slow" p14:dur="2000" advTm="5552"/>
     </mc:Choice>
-    <mc:Fallback>
+    <mc:Fallback xmlns="">
       <p:transition spd="slow" advTm="5552"/>
     </mc:Fallback>
   </mc:AlternateContent>
@@ -6369,11 +6369,11 @@
   <p:clrMapOvr>
     <a:masterClrMapping/>
   </p:clrMapOvr>
-  <mc:AlternateContent xmlns:mc="http://schemas.openxmlformats.org/markup-compatibility/2006">
-    <mc:Choice xmlns:p14="http://schemas.microsoft.com/office/powerpoint/2010/main" Requires="p14">
+  <mc:AlternateContent xmlns:mc="http://schemas.openxmlformats.org/markup-compatibility/2006" xmlns:p14="http://schemas.microsoft.com/office/powerpoint/2010/main">
+    <mc:Choice Requires="p14">
       <p:transition spd="slow" p14:dur="2000" advTm="6148"/>
     </mc:Choice>
-    <mc:Fallback>
+    <mc:Fallback xmlns="">
       <p:transition spd="slow" advTm="6148"/>
     </mc:Fallback>
   </mc:AlternateContent>
@@ -6849,11 +6849,11 @@
   <p:clrMapOvr>
     <a:masterClrMapping/>
   </p:clrMapOvr>
-  <mc:AlternateContent xmlns:mc="http://schemas.openxmlformats.org/markup-compatibility/2006">
-    <mc:Choice xmlns:p14="http://schemas.microsoft.com/office/powerpoint/2010/main" Requires="p14">
+  <mc:AlternateContent xmlns:mc="http://schemas.openxmlformats.org/markup-compatibility/2006" xmlns:p14="http://schemas.microsoft.com/office/powerpoint/2010/main">
+    <mc:Choice Requires="p14">
       <p:transition spd="slow" p14:dur="2000" advTm="6233"/>
     </mc:Choice>
-    <mc:Fallback>
+    <mc:Fallback xmlns="">
       <p:transition spd="slow" advTm="6233"/>
     </mc:Fallback>
   </mc:AlternateContent>
@@ -7130,11 +7130,11 @@
   <p:clrMapOvr>
     <a:masterClrMapping/>
   </p:clrMapOvr>
-  <mc:AlternateContent xmlns:mc="http://schemas.openxmlformats.org/markup-compatibility/2006">
-    <mc:Choice xmlns:p14="http://schemas.microsoft.com/office/powerpoint/2010/main" Requires="p14">
+  <mc:AlternateContent xmlns:mc="http://schemas.openxmlformats.org/markup-compatibility/2006" xmlns:p14="http://schemas.microsoft.com/office/powerpoint/2010/main">
+    <mc:Choice Requires="p14">
       <p:transition spd="slow" p14:dur="2000" advTm="5861"/>
     </mc:Choice>
-    <mc:Fallback>
+    <mc:Fallback xmlns="">
       <p:transition spd="slow" advTm="5861"/>
     </mc:Fallback>
   </mc:AlternateContent>
@@ -7371,11 +7371,11 @@
   <p:clrMapOvr>
     <a:masterClrMapping/>
   </p:clrMapOvr>
-  <mc:AlternateContent xmlns:mc="http://schemas.openxmlformats.org/markup-compatibility/2006">
-    <mc:Choice xmlns:p14="http://schemas.microsoft.com/office/powerpoint/2010/main" Requires="p14">
+  <mc:AlternateContent xmlns:mc="http://schemas.openxmlformats.org/markup-compatibility/2006" xmlns:p14="http://schemas.microsoft.com/office/powerpoint/2010/main">
+    <mc:Choice Requires="p14">
       <p:transition spd="slow" p14:dur="2000" advTm="6004"/>
     </mc:Choice>
-    <mc:Fallback>
+    <mc:Fallback xmlns="">
       <p:transition spd="slow" advTm="6004"/>
     </mc:Fallback>
   </mc:AlternateContent>
@@ -7438,7 +7438,15 @@
           <a:p>
             <a:r>
               <a:rPr lang="en-US" dirty="0"/>
-              <a:t>Please complete you session evaluations</a:t>
+              <a:t>Please </a:t>
+            </a:r>
+            <a:r>
+              <a:rPr lang="en-US"/>
+              <a:t>complete your </a:t>
+            </a:r>
+            <a:r>
+              <a:rPr lang="en-US" dirty="0"/>
+              <a:t>session evaluations</a:t>
             </a:r>
           </a:p>
         </p:txBody>
@@ -7632,11 +7640,11 @@
   <p:clrMapOvr>
     <a:masterClrMapping/>
   </p:clrMapOvr>
-  <mc:AlternateContent xmlns:mc="http://schemas.openxmlformats.org/markup-compatibility/2006">
-    <mc:Choice xmlns:p14="http://schemas.microsoft.com/office/powerpoint/2010/main" Requires="p14">
+  <mc:AlternateContent xmlns:mc="http://schemas.openxmlformats.org/markup-compatibility/2006" xmlns:p14="http://schemas.microsoft.com/office/powerpoint/2010/main">
+    <mc:Choice Requires="p14">
       <p:transition spd="slow" p14:dur="2000" advTm="6524"/>
     </mc:Choice>
-    <mc:Fallback>
+    <mc:Fallback xmlns="">
       <p:transition spd="slow" advTm="6524"/>
     </mc:Fallback>
   </mc:AlternateContent>

</xml_diff>